<commit_message>
Ung dung quan ly cong viec va ghi chu
</commit_message>
<xml_diff>
--- a/B1910276_Duong_Viet_Phat.pptx
+++ b/B1910276_Duong_Viet_Phat.pptx
@@ -3704,8 +3704,8 @@
         </p:nvSpPr>
         <p:spPr>
           <a:xfrm>
-            <a:off x="685800" y="914400"/>
-            <a:ext cx="7772400" cy="1470025"/>
+            <a:off x="266700" y="843301"/>
+            <a:ext cx="8610600" cy="1470025"/>
           </a:xfrm>
         </p:spPr>
         <p:txBody>
@@ -3715,7 +3715,14 @@
             <a:pPr algn="ctr"/>
             <a:r>
               <a:rPr lang="en-US" dirty="0"/>
-              <a:t>BÁO CÁO HỌC PHẦN PHÁT TRIỂN ỨNG DỤNG WEB (CT449)</a:t>
+              <a:t>BÁO CÁO HỌC PHẦN</a:t>
+            </a:r>
+            <a:br>
+              <a:rPr lang="en-US" dirty="0"/>
+            </a:br>
+            <a:r>
+              <a:rPr lang="en-US" dirty="0"/>
+              <a:t>PHÁT TRIỂN ỨNG DỤNG WEB (CT449)</a:t>
             </a:r>
             <a:br>
               <a:rPr lang="en-US" dirty="0"/>
@@ -3751,19 +3758,19 @@
           <a:lstStyle/>
           <a:p>
             <a:r>
-              <a:rPr lang="en-US" altLang="en-US" dirty="0" err="1"/>
+              <a:rPr lang="en-US" altLang="en-US" b="1" dirty="0" err="1"/>
               <a:t>Đề</a:t>
             </a:r>
             <a:r>
-              <a:rPr lang="en-US" altLang="en-US" dirty="0"/>
-              <a:t> </a:t>
-            </a:r>
-            <a:r>
-              <a:rPr lang="en-US" altLang="en-US" dirty="0" err="1"/>
+              <a:rPr lang="en-US" altLang="en-US" b="1" dirty="0"/>
+              <a:t> </a:t>
+            </a:r>
+            <a:r>
+              <a:rPr lang="en-US" altLang="en-US" b="1" dirty="0" err="1"/>
               <a:t>tài</a:t>
             </a:r>
             <a:r>
-              <a:rPr lang="en-US" altLang="en-US" dirty="0"/>
+              <a:rPr lang="en-US" altLang="en-US" b="1" dirty="0"/>
               <a:t>: </a:t>
             </a:r>
             <a:r>
@@ -5431,30 +5438,30 @@
               <a:buChar char="•"/>
             </a:pPr>
             <a:r>
-              <a:rPr lang="en-US" sz="1800" dirty="0"/>
+              <a:rPr lang="en-US" sz="2400" dirty="0"/>
               <a:t>title: </a:t>
             </a:r>
             <a:r>
-              <a:rPr lang="en-US" sz="1800" dirty="0" err="1"/>
+              <a:rPr lang="en-US" sz="2400" dirty="0" err="1"/>
               <a:t>Tên</a:t>
             </a:r>
             <a:r>
-              <a:rPr lang="en-US" sz="1800" dirty="0"/>
-              <a:t> </a:t>
-            </a:r>
-            <a:r>
-              <a:rPr lang="en-US" sz="1800" dirty="0" err="1"/>
+              <a:rPr lang="en-US" sz="2400" dirty="0"/>
+              <a:t> </a:t>
+            </a:r>
+            <a:r>
+              <a:rPr lang="en-US" sz="2400" dirty="0" err="1"/>
               <a:t>công</a:t>
             </a:r>
             <a:r>
-              <a:rPr lang="en-US" sz="1800" dirty="0"/>
-              <a:t> </a:t>
-            </a:r>
-            <a:r>
-              <a:rPr lang="en-US" sz="1800" dirty="0" err="1"/>
+              <a:rPr lang="en-US" sz="2400" dirty="0"/>
+              <a:t> </a:t>
+            </a:r>
+            <a:r>
+              <a:rPr lang="en-US" sz="2400" dirty="0" err="1"/>
               <a:t>việc</a:t>
             </a:r>
-            <a:endParaRPr lang="en-US" sz="1800" dirty="0"/>
+            <a:endParaRPr lang="en-US" sz="2400" dirty="0"/>
           </a:p>
           <a:p>
             <a:pPr lvl="1">
@@ -5462,30 +5469,30 @@
               <a:buChar char="•"/>
             </a:pPr>
             <a:r>
-              <a:rPr lang="en-US" sz="1800" dirty="0"/>
+              <a:rPr lang="en-US" sz="2400" dirty="0"/>
               <a:t>content: </a:t>
             </a:r>
             <a:r>
-              <a:rPr lang="en-US" sz="1800" dirty="0" err="1"/>
+              <a:rPr lang="en-US" sz="2400" dirty="0" err="1"/>
               <a:t>Nội</a:t>
             </a:r>
             <a:r>
-              <a:rPr lang="en-US" sz="1800" dirty="0"/>
+              <a:rPr lang="en-US" sz="2400" dirty="0"/>
               <a:t> dung </a:t>
             </a:r>
             <a:r>
-              <a:rPr lang="en-US" sz="1800" dirty="0" err="1"/>
+              <a:rPr lang="en-US" sz="2400" dirty="0" err="1"/>
               <a:t>công</a:t>
             </a:r>
             <a:r>
-              <a:rPr lang="en-US" sz="1800" dirty="0"/>
-              <a:t> </a:t>
-            </a:r>
-            <a:r>
-              <a:rPr lang="en-US" sz="1800" dirty="0" err="1"/>
+              <a:rPr lang="en-US" sz="2400" dirty="0"/>
+              <a:t> </a:t>
+            </a:r>
+            <a:r>
+              <a:rPr lang="en-US" sz="2400" dirty="0" err="1"/>
               <a:t>việc</a:t>
             </a:r>
-            <a:endParaRPr lang="en-US" sz="1800" dirty="0"/>
+            <a:endParaRPr lang="en-US" sz="2400" dirty="0"/>
           </a:p>
           <a:p>
             <a:pPr lvl="1">
@@ -5493,62 +5500,62 @@
               <a:buChar char="•"/>
             </a:pPr>
             <a:r>
-              <a:rPr lang="en-US" sz="1800" dirty="0"/>
+              <a:rPr lang="en-US" sz="2400" dirty="0"/>
               <a:t>deadline: </a:t>
             </a:r>
             <a:r>
-              <a:rPr lang="en-US" sz="1800" dirty="0" err="1"/>
+              <a:rPr lang="en-US" sz="2400" dirty="0" err="1"/>
               <a:t>Thời</a:t>
             </a:r>
             <a:r>
-              <a:rPr lang="en-US" sz="1800" dirty="0"/>
-              <a:t> </a:t>
-            </a:r>
-            <a:r>
-              <a:rPr lang="en-US" sz="1800" dirty="0" err="1"/>
+              <a:rPr lang="en-US" sz="2400" dirty="0"/>
+              <a:t> </a:t>
+            </a:r>
+            <a:r>
+              <a:rPr lang="en-US" sz="2400" dirty="0" err="1"/>
               <a:t>gian</a:t>
             </a:r>
             <a:r>
-              <a:rPr lang="en-US" sz="1800" dirty="0"/>
-              <a:t> </a:t>
-            </a:r>
-            <a:r>
-              <a:rPr lang="en-US" sz="1800" dirty="0" err="1"/>
+              <a:rPr lang="en-US" sz="2400" dirty="0"/>
+              <a:t> </a:t>
+            </a:r>
+            <a:r>
+              <a:rPr lang="en-US" sz="2400" dirty="0" err="1"/>
               <a:t>hạn</a:t>
             </a:r>
             <a:r>
-              <a:rPr lang="en-US" sz="1800" dirty="0"/>
-              <a:t> </a:t>
-            </a:r>
-            <a:r>
-              <a:rPr lang="en-US" sz="1800" dirty="0" err="1"/>
+              <a:rPr lang="en-US" sz="2400" dirty="0"/>
+              <a:t> </a:t>
+            </a:r>
+            <a:r>
+              <a:rPr lang="en-US" sz="2400" dirty="0" err="1"/>
               <a:t>cuối</a:t>
             </a:r>
             <a:r>
-              <a:rPr lang="en-US" sz="1800" dirty="0"/>
-              <a:t> </a:t>
-            </a:r>
-            <a:r>
-              <a:rPr lang="en-US" sz="1800" dirty="0" err="1"/>
+              <a:rPr lang="en-US" sz="2400" dirty="0"/>
+              <a:t> </a:t>
+            </a:r>
+            <a:r>
+              <a:rPr lang="en-US" sz="2400" dirty="0" err="1"/>
               <a:t>của</a:t>
             </a:r>
             <a:r>
-              <a:rPr lang="en-US" sz="1800" dirty="0"/>
-              <a:t> </a:t>
-            </a:r>
-            <a:r>
-              <a:rPr lang="en-US" sz="1800" dirty="0" err="1"/>
+              <a:rPr lang="en-US" sz="2400" dirty="0"/>
+              <a:t> </a:t>
+            </a:r>
+            <a:r>
+              <a:rPr lang="en-US" sz="2400" dirty="0" err="1"/>
               <a:t>công</a:t>
             </a:r>
             <a:r>
-              <a:rPr lang="en-US" sz="1800" dirty="0"/>
-              <a:t> </a:t>
-            </a:r>
-            <a:r>
-              <a:rPr lang="en-US" sz="1800" dirty="0" err="1"/>
+              <a:rPr lang="en-US" sz="2400" dirty="0"/>
+              <a:t> </a:t>
+            </a:r>
+            <a:r>
+              <a:rPr lang="en-US" sz="2400" dirty="0" err="1"/>
               <a:t>việc</a:t>
             </a:r>
-            <a:endParaRPr lang="en-US" sz="1800" dirty="0"/>
+            <a:endParaRPr lang="en-US" sz="2400" dirty="0"/>
           </a:p>
           <a:p>
             <a:pPr lvl="1">
@@ -5556,54 +5563,54 @@
               <a:buChar char="•"/>
             </a:pPr>
             <a:r>
-              <a:rPr lang="en-US" sz="1800" dirty="0"/>
+              <a:rPr lang="en-US" sz="2400" dirty="0"/>
               <a:t>complete: </a:t>
             </a:r>
             <a:r>
-              <a:rPr lang="en-US" sz="1800" dirty="0" err="1"/>
+              <a:rPr lang="en-US" sz="2400" dirty="0" err="1"/>
               <a:t>Tiến</a:t>
             </a:r>
             <a:r>
-              <a:rPr lang="en-US" sz="1800" dirty="0"/>
-              <a:t> </a:t>
-            </a:r>
-            <a:r>
-              <a:rPr lang="en-US" sz="1800" dirty="0" err="1"/>
+              <a:rPr lang="en-US" sz="2400" dirty="0"/>
+              <a:t> </a:t>
+            </a:r>
+            <a:r>
+              <a:rPr lang="en-US" sz="2400" dirty="0" err="1"/>
               <a:t>độ</a:t>
             </a:r>
             <a:r>
-              <a:rPr lang="en-US" sz="1800" dirty="0"/>
-              <a:t> </a:t>
-            </a:r>
-            <a:r>
-              <a:rPr lang="en-US" sz="1800" dirty="0" err="1"/>
+              <a:rPr lang="en-US" sz="2400" dirty="0"/>
+              <a:t> </a:t>
+            </a:r>
+            <a:r>
+              <a:rPr lang="en-US" sz="2400" dirty="0" err="1"/>
               <a:t>hoàn</a:t>
             </a:r>
             <a:r>
-              <a:rPr lang="en-US" sz="1800" dirty="0"/>
-              <a:t> </a:t>
-            </a:r>
-            <a:r>
-              <a:rPr lang="en-US" sz="1800" dirty="0" err="1"/>
+              <a:rPr lang="en-US" sz="2400" dirty="0"/>
+              <a:t> </a:t>
+            </a:r>
+            <a:r>
+              <a:rPr lang="en-US" sz="2400" dirty="0" err="1"/>
               <a:t>thành</a:t>
             </a:r>
             <a:r>
-              <a:rPr lang="en-US" sz="1800" dirty="0"/>
+              <a:rPr lang="en-US" sz="2400" dirty="0"/>
               <a:t> hay chưa </a:t>
             </a:r>
             <a:r>
-              <a:rPr lang="en-US" sz="1800" dirty="0" err="1"/>
+              <a:rPr lang="en-US" sz="2400" dirty="0" err="1"/>
               <a:t>hoàn</a:t>
             </a:r>
             <a:r>
-              <a:rPr lang="en-US" sz="1800" dirty="0"/>
-              <a:t> </a:t>
-            </a:r>
-            <a:r>
-              <a:rPr lang="en-US" sz="1800" dirty="0" err="1"/>
+              <a:rPr lang="en-US" sz="2400" dirty="0"/>
+              <a:t> </a:t>
+            </a:r>
+            <a:r>
+              <a:rPr lang="en-US" sz="2400" dirty="0" err="1"/>
               <a:t>thành</a:t>
             </a:r>
-            <a:endParaRPr lang="en-US" sz="1800" dirty="0"/>
+            <a:endParaRPr lang="en-US" sz="2400" dirty="0"/>
           </a:p>
           <a:p>
             <a:pPr marL="0" indent="0">
@@ -5613,17 +5620,6 @@
               <a:rPr lang="en-US" sz="2100" dirty="0"/>
               <a:t>	</a:t>
             </a:r>
-          </a:p>
-          <a:p>
-            <a:pPr marL="457200" lvl="1" indent="0">
-              <a:spcBef>
-                <a:spcPts val="0"/>
-              </a:spcBef>
-              <a:spcAft>
-                <a:spcPts val="0"/>
-              </a:spcAft>
-              <a:buNone/>
-            </a:pPr>
             <a:endParaRPr lang="en-US" dirty="0"/>
           </a:p>
           <a:p>
@@ -5641,38 +5637,38 @@
               <a:buChar char="•"/>
             </a:pPr>
             <a:r>
-              <a:rPr lang="en-US" sz="2100" dirty="0"/>
+              <a:rPr lang="en-US" sz="2400" dirty="0"/>
               <a:t>title: </a:t>
             </a:r>
             <a:r>
-              <a:rPr lang="en-US" sz="2100" dirty="0" err="1"/>
+              <a:rPr lang="en-US" sz="2400" dirty="0" err="1"/>
               <a:t>Tiêu</a:t>
             </a:r>
             <a:r>
-              <a:rPr lang="en-US" sz="2100" dirty="0"/>
-              <a:t> </a:t>
-            </a:r>
-            <a:r>
-              <a:rPr lang="en-US" sz="2100" dirty="0" err="1"/>
+              <a:rPr lang="en-US" sz="2400" dirty="0"/>
+              <a:t> </a:t>
+            </a:r>
+            <a:r>
+              <a:rPr lang="en-US" sz="2400" dirty="0" err="1"/>
               <a:t>đề</a:t>
             </a:r>
             <a:r>
-              <a:rPr lang="en-US" sz="2100" dirty="0"/>
-              <a:t> </a:t>
-            </a:r>
-            <a:r>
-              <a:rPr lang="en-US" sz="2100" dirty="0" err="1"/>
+              <a:rPr lang="en-US" sz="2400" dirty="0"/>
+              <a:t> </a:t>
+            </a:r>
+            <a:r>
+              <a:rPr lang="en-US" sz="2400" dirty="0" err="1"/>
               <a:t>ghi</a:t>
             </a:r>
             <a:r>
-              <a:rPr lang="en-US" sz="2100" dirty="0"/>
-              <a:t> </a:t>
-            </a:r>
-            <a:r>
-              <a:rPr lang="en-US" sz="2100" dirty="0" err="1"/>
+              <a:rPr lang="en-US" sz="2400" dirty="0"/>
+              <a:t> </a:t>
+            </a:r>
+            <a:r>
+              <a:rPr lang="en-US" sz="2400" dirty="0" err="1"/>
               <a:t>chú</a:t>
             </a:r>
-            <a:endParaRPr lang="en-US" sz="2100" dirty="0"/>
+            <a:endParaRPr lang="en-US" sz="2400" dirty="0"/>
           </a:p>
           <a:p>
             <a:pPr lvl="1">
@@ -5680,38 +5676,38 @@
               <a:buChar char="•"/>
             </a:pPr>
             <a:r>
-              <a:rPr lang="en-US" sz="2100" dirty="0"/>
+              <a:rPr lang="en-US" sz="2400" dirty="0"/>
               <a:t>content: </a:t>
             </a:r>
             <a:r>
-              <a:rPr lang="en-US" sz="2100" dirty="0" err="1"/>
+              <a:rPr lang="en-US" sz="2400" dirty="0" err="1"/>
               <a:t>Nội</a:t>
             </a:r>
             <a:r>
-              <a:rPr lang="en-US" sz="2100" dirty="0"/>
+              <a:rPr lang="en-US" sz="2400" dirty="0"/>
               <a:t> dung </a:t>
             </a:r>
             <a:r>
-              <a:rPr lang="en-US" sz="2100" dirty="0" err="1"/>
+              <a:rPr lang="en-US" sz="2400" dirty="0" err="1"/>
               <a:t>bản</a:t>
             </a:r>
             <a:r>
-              <a:rPr lang="en-US" sz="2100" dirty="0"/>
-              <a:t> </a:t>
-            </a:r>
-            <a:r>
-              <a:rPr lang="en-US" sz="2100" dirty="0" err="1"/>
+              <a:rPr lang="en-US" sz="2400" dirty="0"/>
+              <a:t> </a:t>
+            </a:r>
+            <a:r>
+              <a:rPr lang="en-US" sz="2400" dirty="0" err="1"/>
               <a:t>ghi</a:t>
             </a:r>
             <a:r>
-              <a:rPr lang="en-US" sz="2100" dirty="0"/>
-              <a:t> </a:t>
-            </a:r>
-            <a:r>
-              <a:rPr lang="en-US" sz="2100" dirty="0" err="1"/>
+              <a:rPr lang="en-US" sz="2400" dirty="0"/>
+              <a:t> </a:t>
+            </a:r>
+            <a:r>
+              <a:rPr lang="en-US" sz="2400" dirty="0" err="1"/>
               <a:t>chú</a:t>
             </a:r>
-            <a:endParaRPr lang="en-US" sz="2100" dirty="0"/>
+            <a:endParaRPr lang="en-US" sz="2400" dirty="0"/>
           </a:p>
           <a:p>
             <a:pPr lvl="1">
@@ -5719,54 +5715,54 @@
               <a:buChar char="•"/>
             </a:pPr>
             <a:r>
-              <a:rPr lang="en-US" sz="2100" dirty="0"/>
+              <a:rPr lang="en-US" sz="2400" dirty="0"/>
               <a:t>cover: URL </a:t>
             </a:r>
             <a:r>
-              <a:rPr lang="en-US" sz="2100" dirty="0" err="1"/>
+              <a:rPr lang="en-US" sz="2400" dirty="0" err="1"/>
               <a:t>ảnh</a:t>
             </a:r>
             <a:r>
-              <a:rPr lang="en-US" sz="2100" dirty="0"/>
-              <a:t> </a:t>
-            </a:r>
-            <a:r>
-              <a:rPr lang="en-US" sz="2100" dirty="0" err="1"/>
+              <a:rPr lang="en-US" sz="2400" dirty="0"/>
+              <a:t> </a:t>
+            </a:r>
+            <a:r>
+              <a:rPr lang="en-US" sz="2400" dirty="0" err="1"/>
               <a:t>bìa</a:t>
             </a:r>
             <a:r>
-              <a:rPr lang="en-US" sz="2100" dirty="0"/>
-              <a:t> </a:t>
-            </a:r>
-            <a:r>
-              <a:rPr lang="en-US" sz="2100" dirty="0" err="1"/>
+              <a:rPr lang="en-US" sz="2400" dirty="0"/>
+              <a:t> </a:t>
+            </a:r>
+            <a:r>
+              <a:rPr lang="en-US" sz="2400" dirty="0" err="1"/>
               <a:t>cho</a:t>
             </a:r>
             <a:r>
-              <a:rPr lang="en-US" sz="2100" dirty="0"/>
-              <a:t> </a:t>
-            </a:r>
-            <a:r>
-              <a:rPr lang="en-US" sz="2100" dirty="0" err="1"/>
+              <a:rPr lang="en-US" sz="2400" dirty="0"/>
+              <a:t> </a:t>
+            </a:r>
+            <a:r>
+              <a:rPr lang="en-US" sz="2400" dirty="0" err="1"/>
               <a:t>bản</a:t>
             </a:r>
             <a:r>
-              <a:rPr lang="en-US" sz="2100" dirty="0"/>
-              <a:t> </a:t>
-            </a:r>
-            <a:r>
-              <a:rPr lang="en-US" sz="2100" dirty="0" err="1"/>
+              <a:rPr lang="en-US" sz="2400" dirty="0"/>
+              <a:t> </a:t>
+            </a:r>
+            <a:r>
+              <a:rPr lang="en-US" sz="2400" dirty="0" err="1"/>
               <a:t>ghi</a:t>
             </a:r>
             <a:r>
-              <a:rPr lang="en-US" sz="2100" dirty="0"/>
-              <a:t> </a:t>
-            </a:r>
-            <a:r>
-              <a:rPr lang="en-US" sz="2100" dirty="0" err="1"/>
+              <a:rPr lang="en-US" sz="2400" dirty="0"/>
+              <a:t> </a:t>
+            </a:r>
+            <a:r>
+              <a:rPr lang="en-US" sz="2400" dirty="0" err="1"/>
               <a:t>chú</a:t>
             </a:r>
-            <a:endParaRPr lang="en-US" sz="2100" dirty="0"/>
+            <a:endParaRPr lang="en-US" sz="2400" dirty="0"/>
           </a:p>
           <a:p>
             <a:pPr lvl="1">
@@ -5774,38 +5770,38 @@
               <a:buChar char="•"/>
             </a:pPr>
             <a:r>
-              <a:rPr lang="en-US" sz="2100" dirty="0"/>
+              <a:rPr lang="en-US" sz="2400" dirty="0"/>
               <a:t>favorite: </a:t>
             </a:r>
             <a:r>
-              <a:rPr lang="en-US" sz="2100" dirty="0" err="1"/>
+              <a:rPr lang="en-US" sz="2400" dirty="0" err="1"/>
               <a:t>Trạng</a:t>
             </a:r>
             <a:r>
-              <a:rPr lang="en-US" sz="2100" dirty="0"/>
-              <a:t> </a:t>
-            </a:r>
-            <a:r>
-              <a:rPr lang="en-US" sz="2100" dirty="0" err="1"/>
+              <a:rPr lang="en-US" sz="2400" dirty="0"/>
+              <a:t> </a:t>
+            </a:r>
+            <a:r>
+              <a:rPr lang="en-US" sz="2400" dirty="0" err="1"/>
               <a:t>thái</a:t>
             </a:r>
             <a:r>
-              <a:rPr lang="en-US" sz="2100" dirty="0"/>
-              <a:t> </a:t>
-            </a:r>
-            <a:r>
-              <a:rPr lang="en-US" sz="2100" dirty="0" err="1"/>
+              <a:rPr lang="en-US" sz="2400" dirty="0"/>
+              <a:t> </a:t>
+            </a:r>
+            <a:r>
+              <a:rPr lang="en-US" sz="2400" dirty="0" err="1"/>
               <a:t>yêu</a:t>
             </a:r>
             <a:r>
-              <a:rPr lang="en-US" sz="2100" dirty="0"/>
-              <a:t> </a:t>
-            </a:r>
-            <a:r>
-              <a:rPr lang="en-US" sz="2100" dirty="0" err="1"/>
+              <a:rPr lang="en-US" sz="2400" dirty="0"/>
+              <a:t> </a:t>
+            </a:r>
+            <a:r>
+              <a:rPr lang="en-US" sz="2400" dirty="0" err="1"/>
               <a:t>thích</a:t>
             </a:r>
-            <a:endParaRPr lang="en-US" sz="2100" dirty="0"/>
+            <a:endParaRPr lang="en-US" sz="2400" dirty="0"/>
           </a:p>
           <a:p>
             <a:pPr marL="0" indent="0">

</xml_diff>